<commit_message>
signup login done :D
</commit_message>
<xml_diff>
--- a/Working plan/Project plan.pptx
+++ b/Working plan/Project plan.pptx
@@ -16191,7 +16191,7 @@
         <p:spPr>
           <a:xfrm>
             <a:off x="3300549" y="1540201"/>
-            <a:ext cx="4554582" cy="4801314"/>
+            <a:ext cx="4554582" cy="4524315"/>
           </a:xfrm>
           <a:prstGeom prst="rect">
             <a:avLst/>
@@ -16260,11 +16260,12 @@
                 </a:solidFill>
                 <a:latin typeface="Arial" panose="020B0604020202020204" pitchFamily="34" charset="0"/>
               </a:rPr>
-              <a:t>Menu :{</a:t>
+              <a:t>Menu :</a:t>
             </a:r>
             <a:endParaRPr lang="fr-FR" dirty="0"/>
           </a:p>
           <a:p>
+            <a:pPr lvl="1"/>
             <a:r>
               <a:rPr lang="fr-FR" dirty="0">
                 <a:solidFill>
@@ -16277,6 +16278,7 @@
             <a:endParaRPr lang="fr-FR" dirty="0"/>
           </a:p>
           <a:p>
+            <a:pPr lvl="1"/>
             <a:r>
               <a:rPr lang="fr-FR" dirty="0">
                 <a:solidFill>
@@ -16289,6 +16291,7 @@
             <a:endParaRPr lang="fr-FR" dirty="0"/>
           </a:p>
           <a:p>
+            <a:pPr lvl="1"/>
             <a:r>
               <a:rPr lang="fr-FR" dirty="0">
                 <a:solidFill>
@@ -16296,7 +16299,7 @@
                 </a:solidFill>
                 <a:latin typeface="Arial" panose="020B0604020202020204" pitchFamily="34" charset="0"/>
               </a:rPr>
-              <a:t>Dessert:}</a:t>
+              <a:t>Dessert:</a:t>
             </a:r>
             <a:endParaRPr lang="fr-FR" dirty="0"/>
           </a:p>
@@ -16447,45 +16450,6 @@
               </a:rPr>
               <a:t>Images :</a:t>
             </a:r>
-          </a:p>
-          <a:p>
-            <a:r>
-              <a:rPr lang="fr-FR" dirty="0" err="1">
-                <a:solidFill>
-                  <a:srgbClr val="000000"/>
-                </a:solidFill>
-                <a:latin typeface="Arial" panose="020B0604020202020204" pitchFamily="34" charset="0"/>
-              </a:rPr>
-              <a:t>Guests</a:t>
-            </a:r>
-            <a:r>
-              <a:rPr lang="fr-FR" dirty="0">
-                <a:solidFill>
-                  <a:srgbClr val="000000"/>
-                </a:solidFill>
-                <a:latin typeface="Arial" panose="020B0604020202020204" pitchFamily="34" charset="0"/>
-              </a:rPr>
-              <a:t> [</a:t>
-            </a:r>
-            <a:r>
-              <a:rPr lang="fr-FR" dirty="0" err="1">
-                <a:solidFill>
-                  <a:srgbClr val="000000"/>
-                </a:solidFill>
-                <a:latin typeface="Arial" panose="020B0604020202020204" pitchFamily="34" charset="0"/>
-              </a:rPr>
-              <a:t>users</a:t>
-            </a:r>
-            <a:r>
-              <a:rPr lang="fr-FR" dirty="0">
-                <a:solidFill>
-                  <a:srgbClr val="000000"/>
-                </a:solidFill>
-                <a:latin typeface="Arial" panose="020B0604020202020204" pitchFamily="34" charset="0"/>
-              </a:rPr>
-              <a:t> ID,…]</a:t>
-            </a:r>
-            <a:endParaRPr lang="fr-FR" dirty="0"/>
           </a:p>
         </p:txBody>
       </p:sp>

</xml_diff>